<commit_message>
UPDATE SLIDES LECTURE 2
</commit_message>
<xml_diff>
--- a/STT465_2.pptx
+++ b/STT465_2.pptx
@@ -4314,17 +4314,7 @@
                   </a:schemeClr>
                 </a:solidFill>
               </a:rPr>
-              <a:t>Belief, probability, independence, conditional independence, </a:t>
-            </a:r>
-            <a:r>
-              <a:rPr lang="en-US" sz="3200" dirty="0" smtClean="0">
-                <a:solidFill>
-                  <a:schemeClr val="accent2">
-                    <a:lumMod val="75000"/>
-                  </a:schemeClr>
-                </a:solidFill>
-              </a:rPr>
-              <a:t>exchangeability</a:t>
+              <a:t>Belief, probability, independence, conditional independence, exchangeability</a:t>
             </a:r>
             <a:br>
               <a:rPr lang="en-US" sz="3200" dirty="0" smtClean="0">
@@ -5197,7 +5187,7 @@
                   </a:schemeClr>
                 </a:solidFill>
               </a:rPr>
-              <a:t>)=P(</a:t>
+              <a:t>)</a:t>
             </a:r>
             <a:r>
               <a:rPr lang="en-US" dirty="0" smtClean="0">
@@ -5207,7 +5197,17 @@
                   </a:schemeClr>
                 </a:solidFill>
               </a:rPr>
-              <a:t>A)P(A|B) + P(Not B)</a:t>
+              <a:t>=P</a:t>
+            </a:r>
+            <a:r>
+              <a:rPr lang="en-US" dirty="0" smtClean="0">
+                <a:solidFill>
+                  <a:schemeClr val="accent1">
+                    <a:lumMod val="75000"/>
+                  </a:schemeClr>
+                </a:solidFill>
+              </a:rPr>
+              <a:t>(A|B</a:t>
             </a:r>
             <a:r>
               <a:rPr lang="en-US" dirty="0">
@@ -5217,7 +5217,7 @@
                   </a:schemeClr>
                 </a:solidFill>
               </a:rPr>
-              <a:t>P</a:t>
+              <a:t>) P(B) </a:t>
             </a:r>
             <a:r>
               <a:rPr lang="en-US" dirty="0" smtClean="0">
@@ -5227,7 +5227,17 @@
                   </a:schemeClr>
                 </a:solidFill>
               </a:rPr>
-              <a:t>(</a:t>
+              <a:t>+</a:t>
+            </a:r>
+            <a:r>
+              <a:rPr lang="en-US" dirty="0" smtClean="0">
+                <a:solidFill>
+                  <a:schemeClr val="accent1">
+                    <a:lumMod val="75000"/>
+                  </a:schemeClr>
+                </a:solidFill>
+              </a:rPr>
+              <a:t>P(</a:t>
             </a:r>
             <a:r>
               <a:rPr lang="en-US" dirty="0" err="1">
@@ -5237,28 +5247,75 @@
                   </a:schemeClr>
                 </a:solidFill>
               </a:rPr>
+              <a:t>A</a:t>
+            </a:r>
+            <a:r>
+              <a:rPr lang="en-US" dirty="0" err="1" smtClean="0">
+                <a:solidFill>
+                  <a:schemeClr val="accent1">
+                    <a:lumMod val="75000"/>
+                  </a:schemeClr>
+                </a:solidFill>
+              </a:rPr>
+              <a:t>|</a:t>
+            </a:r>
+            <a:r>
+              <a:rPr lang="en-US" dirty="0" err="1" smtClean="0">
+                <a:solidFill>
+                  <a:schemeClr val="accent1">
+                    <a:lumMod val="75000"/>
+                  </a:schemeClr>
+                </a:solidFill>
+              </a:rPr>
+              <a:t>Not</a:t>
+            </a:r>
+            <a:r>
+              <a:rPr lang="en-US" dirty="0" smtClean="0">
+                <a:solidFill>
+                  <a:schemeClr val="accent1">
+                    <a:lumMod val="75000"/>
+                  </a:schemeClr>
+                </a:solidFill>
+              </a:rPr>
+              <a:t> </a:t>
+            </a:r>
+            <a:r>
+              <a:rPr lang="en-US" dirty="0">
+                <a:solidFill>
+                  <a:schemeClr val="accent1">
+                    <a:lumMod val="75000"/>
+                  </a:schemeClr>
+                </a:solidFill>
+              </a:rPr>
               <a:t>B</a:t>
             </a:r>
             <a:r>
-              <a:rPr lang="en-US" dirty="0" err="1" smtClean="0">
+              <a:rPr lang="en-US" dirty="0" smtClean="0">
                 <a:solidFill>
                   <a:schemeClr val="accent1">
                     <a:lumMod val="75000"/>
                   </a:schemeClr>
                 </a:solidFill>
               </a:rPr>
-              <a:t>|Not</a:t>
-            </a:r>
-            <a:r>
-              <a:rPr lang="en-US" dirty="0" smtClean="0">
+              <a:t>)P</a:t>
+            </a:r>
+            <a:r>
+              <a:rPr lang="en-US" dirty="0">
                 <a:solidFill>
                   <a:schemeClr val="accent1">
                     <a:lumMod val="75000"/>
                   </a:schemeClr>
                 </a:solidFill>
               </a:rPr>
-              <a:t> A)</a:t>
-            </a:r>
+              <a:t>(Not B)</a:t>
+            </a:r>
+            <a:endParaRPr lang="en-US" dirty="0" smtClean="0">
+              <a:solidFill>
+                <a:schemeClr val="accent1">
+                  <a:lumMod val="75000"/>
+                </a:schemeClr>
+              </a:solidFill>
+            </a:endParaRPr>
           </a:p>
           <a:p>
             <a:pPr marL="285750" indent="-285750">
@@ -6697,18 +6754,7 @@
                   </a:schemeClr>
                 </a:solidFill>
               </a:rPr>
-              <a:t>(4) The joint probability of disease and genotypes, p(D,G</a:t>
-            </a:r>
-            <a:r>
-              <a:rPr lang="en-US" dirty="0" smtClean="0">
-                <a:solidFill>
-                  <a:schemeClr val="tx1">
-                    <a:lumMod val="65000"/>
-                    <a:lumOff val="35000"/>
-                  </a:schemeClr>
-                </a:solidFill>
-              </a:rPr>
-              <a:t>)</a:t>
+              <a:t>(4) The joint probability of disease and genotypes, p(D,G)</a:t>
             </a:r>
           </a:p>
           <a:p>
@@ -8011,7 +8057,7 @@
         <p:spPr>
           <a:xfrm>
             <a:off x="457200" y="762000"/>
-            <a:ext cx="8229600" cy="5355313"/>
+            <a:ext cx="8382000" cy="5909311"/>
           </a:xfrm>
           <a:prstGeom prst="rect">
             <a:avLst/>
@@ -8030,6 +8076,88 @@
           </a:bodyPr>
           <a:lstStyle/>
           <a:p>
+            <a:endParaRPr lang="en-US" dirty="0">
+              <a:solidFill>
+                <a:schemeClr val="accent1">
+                  <a:lumMod val="75000"/>
+                </a:schemeClr>
+              </a:solidFill>
+            </a:endParaRPr>
+          </a:p>
+          <a:p>
+            <a:pPr marL="285750" indent="-285750">
+              <a:buFont typeface="Symbol" charset="0"/>
+              <a:buChar char=""/>
+            </a:pPr>
+            <a:r>
+              <a:rPr lang="en-US" dirty="0" smtClean="0">
+                <a:solidFill>
+                  <a:schemeClr val="accent1">
+                    <a:lumMod val="75000"/>
+                  </a:schemeClr>
+                </a:solidFill>
+              </a:rPr>
+              <a:t>Goal: to make statements about the genotype</a:t>
+            </a:r>
+          </a:p>
+          <a:p>
+            <a:r>
+              <a:rPr lang="en-US" dirty="0">
+                <a:solidFill>
+                  <a:schemeClr val="accent1">
+                    <a:lumMod val="75000"/>
+                  </a:schemeClr>
+                </a:solidFill>
+              </a:rPr>
+              <a:t> </a:t>
+            </a:r>
+            <a:r>
+              <a:rPr lang="en-US" dirty="0" smtClean="0">
+                <a:solidFill>
+                  <a:schemeClr val="accent1">
+                    <a:lumMod val="75000"/>
+                  </a:schemeClr>
+                </a:solidFill>
+              </a:rPr>
+              <a:t>                of one of the parents given the phenotype</a:t>
+            </a:r>
+          </a:p>
+          <a:p>
+            <a:r>
+              <a:rPr lang="en-US" dirty="0">
+                <a:solidFill>
+                  <a:schemeClr val="accent1">
+                    <a:lumMod val="75000"/>
+                  </a:schemeClr>
+                </a:solidFill>
+              </a:rPr>
+              <a:t> </a:t>
+            </a:r>
+            <a:r>
+              <a:rPr lang="en-US" dirty="0" smtClean="0">
+                <a:solidFill>
+                  <a:schemeClr val="accent1">
+                    <a:lumMod val="75000"/>
+                  </a:schemeClr>
+                </a:solidFill>
+              </a:rPr>
+              <a:t>                of one or more offspring.</a:t>
+            </a:r>
+          </a:p>
+          <a:p>
+            <a:pPr marL="285750" indent="-285750">
+              <a:buFont typeface="Symbol" charset="0"/>
+              <a:buChar char=""/>
+            </a:pPr>
+            <a:endParaRPr lang="en-US" dirty="0">
+              <a:solidFill>
+                <a:schemeClr val="accent1">
+                  <a:lumMod val="75000"/>
+                </a:schemeClr>
+              </a:solidFill>
+            </a:endParaRPr>
+          </a:p>
+          <a:p>
             <a:pPr marL="285750" indent="-285750">
               <a:buFont typeface="Symbol" charset="0"/>
               <a:buChar char=""/>
@@ -8056,10 +8184,41 @@
             </a:endParaRPr>
           </a:p>
           <a:p>
+            <a:endParaRPr lang="en-US" dirty="0" smtClean="0">
+              <a:solidFill>
+                <a:schemeClr val="accent1">
+                  <a:lumMod val="75000"/>
+                </a:schemeClr>
+              </a:solidFill>
+            </a:endParaRPr>
+          </a:p>
+          <a:p>
+            <a:endParaRPr lang="en-US" dirty="0">
+              <a:solidFill>
+                <a:schemeClr val="accent1">
+                  <a:lumMod val="75000"/>
+                </a:schemeClr>
+              </a:solidFill>
+            </a:endParaRPr>
+          </a:p>
+          <a:p>
             <a:pPr marL="285750" indent="-285750">
               <a:buFont typeface="Symbol" charset="0"/>
               <a:buChar char=""/>
             </a:pPr>
+            <a:endParaRPr lang="en-US" dirty="0" smtClean="0">
+              <a:solidFill>
+                <a:schemeClr val="accent1">
+                  <a:lumMod val="75000"/>
+                </a:schemeClr>
+              </a:solidFill>
+            </a:endParaRPr>
+          </a:p>
+          <a:p>
+            <a:pPr marL="285750" indent="-285750">
+              <a:buFont typeface="Symbol" charset="0"/>
+              <a:buChar char=""/>
+            </a:pPr>
             <a:r>
               <a:rPr lang="en-US" dirty="0" smtClean="0">
                 <a:solidFill>
@@ -8068,19 +8227,17 @@
                   </a:schemeClr>
                 </a:solidFill>
               </a:rPr>
-              <a:t>Goal: to make statements about the genotype</a:t>
-            </a:r>
-          </a:p>
-          <a:p>
-            <a:r>
-              <a:rPr lang="en-US" dirty="0">
+              <a:t>Compute the probability that a parent is a carrier given that the first offspring is healthy p(G</a:t>
+            </a:r>
+            <a:r>
+              <a:rPr lang="en-US" baseline="-25000" dirty="0" smtClean="0">
                 <a:solidFill>
                   <a:schemeClr val="accent1">
                     <a:lumMod val="75000"/>
                   </a:schemeClr>
                 </a:solidFill>
               </a:rPr>
-              <a:t> </a:t>
+              <a:t>0</a:t>
             </a:r>
             <a:r>
               <a:rPr lang="en-US" dirty="0" smtClean="0">
@@ -8090,19 +8247,17 @@
                   </a:schemeClr>
                 </a:solidFill>
               </a:rPr>
-              <a:t>                of one of the parents given the phenotype</a:t>
-            </a:r>
-          </a:p>
-          <a:p>
-            <a:r>
-              <a:rPr lang="en-US" dirty="0">
+              <a:t>=AB|O</a:t>
+            </a:r>
+            <a:r>
+              <a:rPr lang="en-US" baseline="-25000" dirty="0" smtClean="0">
                 <a:solidFill>
                   <a:schemeClr val="accent1">
                     <a:lumMod val="75000"/>
                   </a:schemeClr>
                 </a:solidFill>
               </a:rPr>
-              <a:t> </a:t>
+              <a:t>1</a:t>
             </a:r>
             <a:r>
               <a:rPr lang="en-US" dirty="0" smtClean="0">
@@ -8112,8 +8267,25 @@
                   </a:schemeClr>
                 </a:solidFill>
               </a:rPr>
-              <a:t>                of one or more offspring.</a:t>
-            </a:r>
+              <a:t>=H</a:t>
+            </a:r>
+            <a:r>
+              <a:rPr lang="en-US" dirty="0" smtClean="0">
+                <a:solidFill>
+                  <a:schemeClr val="accent1">
+                    <a:lumMod val="75000"/>
+                  </a:schemeClr>
+                </a:solidFill>
+              </a:rPr>
+              <a:t>) </a:t>
+            </a:r>
+            <a:endParaRPr lang="en-US" dirty="0" smtClean="0">
+              <a:solidFill>
+                <a:schemeClr val="accent1">
+                  <a:lumMod val="75000"/>
+                </a:schemeClr>
+              </a:solidFill>
+            </a:endParaRPr>
           </a:p>
           <a:p>
             <a:pPr marL="285750" indent="-285750">
@@ -8133,13 +8305,26 @@
               <a:buFont typeface="Symbol" charset="0"/>
               <a:buChar char=""/>
             </a:pPr>
-            <a:endParaRPr lang="en-US" dirty="0" smtClean="0">
-              <a:solidFill>
-                <a:schemeClr val="accent1">
-                  <a:lumMod val="75000"/>
-                </a:schemeClr>
-              </a:solidFill>
-            </a:endParaRPr>
+            <a:r>
+              <a:rPr lang="en-US" dirty="0" smtClean="0">
+                <a:solidFill>
+                  <a:schemeClr val="accent1">
+                    <a:lumMod val="75000"/>
+                  </a:schemeClr>
+                </a:solidFill>
+              </a:rPr>
+              <a:t>Ho would that probability be updated if you know that the second offspring is also healthy</a:t>
+            </a:r>
+            <a:r>
+              <a:rPr lang="en-US" dirty="0" smtClean="0">
+                <a:solidFill>
+                  <a:schemeClr val="accent1">
+                    <a:lumMod val="75000"/>
+                  </a:schemeClr>
+                </a:solidFill>
+              </a:rPr>
+              <a:t>? Hint: you can assume conditional independence; therefore,  </a:t>
+            </a:r>
           </a:p>
           <a:p>
             <a:pPr marL="285750" indent="-285750">
@@ -8155,24 +8340,6 @@
             </a:endParaRPr>
           </a:p>
           <a:p>
-            <a:endParaRPr lang="en-US" dirty="0" smtClean="0">
-              <a:solidFill>
-                <a:schemeClr val="accent1">
-                  <a:lumMod val="75000"/>
-                </a:schemeClr>
-              </a:solidFill>
-            </a:endParaRPr>
-          </a:p>
-          <a:p>
-            <a:endParaRPr lang="en-US" dirty="0">
-              <a:solidFill>
-                <a:schemeClr val="accent1">
-                  <a:lumMod val="75000"/>
-                </a:schemeClr>
-              </a:solidFill>
-            </a:endParaRPr>
-          </a:p>
-          <a:p>
             <a:pPr marL="285750" indent="-285750">
               <a:buFont typeface="Symbol" charset="0"/>
               <a:buChar char=""/>
@@ -8186,10 +8353,16 @@
             </a:endParaRPr>
           </a:p>
           <a:p>
-            <a:pPr marL="285750" indent="-285750">
-              <a:buFont typeface="Symbol" charset="0"/>
-              <a:buChar char=""/>
-            </a:pPr>
+            <a:r>
+              <a:rPr lang="en-US" dirty="0">
+                <a:solidFill>
+                  <a:schemeClr val="accent1">
+                    <a:lumMod val="75000"/>
+                  </a:schemeClr>
+                </a:solidFill>
+              </a:rPr>
+              <a:t> </a:t>
+            </a:r>
             <a:r>
               <a:rPr lang="en-US" dirty="0" smtClean="0">
                 <a:solidFill>
@@ -8198,54 +8371,10 @@
                   </a:schemeClr>
                 </a:solidFill>
               </a:rPr>
-              <a:t>Compute the probability that a parent is a carrier given that the first offspring is healthy p(G</a:t>
-            </a:r>
-            <a:r>
-              <a:rPr lang="en-US" baseline="-25000" dirty="0" smtClean="0">
-                <a:solidFill>
-                  <a:schemeClr val="accent1">
-                    <a:lumMod val="75000"/>
-                  </a:schemeClr>
-                </a:solidFill>
-              </a:rPr>
-              <a:t>0</a:t>
-            </a:r>
-            <a:r>
-              <a:rPr lang="en-US" dirty="0" smtClean="0">
-                <a:solidFill>
-                  <a:schemeClr val="accent1">
-                    <a:lumMod val="75000"/>
-                  </a:schemeClr>
-                </a:solidFill>
-              </a:rPr>
-              <a:t>=AB|O</a:t>
-            </a:r>
-            <a:r>
-              <a:rPr lang="en-US" baseline="-25000" dirty="0" smtClean="0">
-                <a:solidFill>
-                  <a:schemeClr val="accent1">
-                    <a:lumMod val="75000"/>
-                  </a:schemeClr>
-                </a:solidFill>
-              </a:rPr>
-              <a:t>1</a:t>
-            </a:r>
-            <a:r>
-              <a:rPr lang="en-US" dirty="0" smtClean="0">
-                <a:solidFill>
-                  <a:schemeClr val="accent1">
-                    <a:lumMod val="75000"/>
-                  </a:schemeClr>
-                </a:solidFill>
-              </a:rPr>
-              <a:t>=H)</a:t>
-            </a:r>
-          </a:p>
-          <a:p>
-            <a:pPr marL="285750" indent="-285750">
-              <a:buFont typeface="Symbol" charset="0"/>
-              <a:buChar char=""/>
-            </a:pPr>
+              <a:t>         </a:t>
+            </a:r>
+          </a:p>
+          <a:p>
             <a:endParaRPr lang="en-US" dirty="0">
               <a:solidFill>
                 <a:schemeClr val="accent1">
@@ -8255,27 +8384,7 @@
             </a:endParaRPr>
           </a:p>
           <a:p>
-            <a:pPr marL="285750" indent="-285750">
-              <a:buFont typeface="Symbol" charset="0"/>
-              <a:buChar char=""/>
-            </a:pPr>
-            <a:r>
-              <a:rPr lang="en-US" dirty="0" smtClean="0">
-                <a:solidFill>
-                  <a:schemeClr val="accent1">
-                    <a:lumMod val="75000"/>
-                  </a:schemeClr>
-                </a:solidFill>
-              </a:rPr>
-              <a:t>Ho would that probability be updated if you know that the second offspring is also healthy?</a:t>
-            </a:r>
-          </a:p>
-          <a:p>
-            <a:pPr marL="285750" indent="-285750">
-              <a:buFont typeface="Symbol" charset="0"/>
-              <a:buChar char=""/>
-            </a:pPr>
-            <a:endParaRPr lang="en-US" dirty="0">
+            <a:endParaRPr lang="en-US" dirty="0" smtClean="0">
               <a:solidFill>
                 <a:schemeClr val="accent1">
                   <a:lumMod val="75000"/>
@@ -8284,10 +8393,6 @@
             </a:endParaRPr>
           </a:p>
           <a:p>
-            <a:pPr marL="285750" indent="-285750">
-              <a:buFont typeface="Symbol" charset="0"/>
-              <a:buChar char=""/>
-            </a:pPr>
             <a:r>
               <a:rPr lang="en-US" dirty="0" smtClean="0">
                 <a:solidFill>
@@ -8296,10 +8401,8 @@
                   </a:schemeClr>
                 </a:solidFill>
               </a:rPr>
-              <a:t>What about if you know that the third offspring developed the disease?</a:t>
-            </a:r>
-          </a:p>
-          <a:p>
+              <a:t>   </a:t>
+            </a:r>
             <a:endParaRPr lang="en-US" dirty="0">
               <a:solidFill>
                 <a:schemeClr val="accent1">
@@ -8319,14 +8422,14 @@
           <p:nvPr/>
         </p:nvPicPr>
         <p:blipFill>
-          <a:blip r:embed="rId3"/>
+          <a:blip r:embed="rId4"/>
           <a:stretch>
             <a:fillRect/>
           </a:stretch>
         </p:blipFill>
         <p:spPr>
           <a:xfrm>
-            <a:off x="5562600" y="1066800"/>
+            <a:off x="5943600" y="914400"/>
             <a:ext cx="1828800" cy="2139553"/>
           </a:xfrm>
           <a:prstGeom prst="rect">
@@ -8342,7 +8445,7 @@
         </p:nvSpPr>
         <p:spPr>
           <a:xfrm>
-            <a:off x="5562600" y="3276600"/>
+            <a:off x="5943600" y="3048000"/>
             <a:ext cx="1905000" cy="338554"/>
           </a:xfrm>
           <a:prstGeom prst="rect">
@@ -8364,6 +8467,63 @@
           </a:p>
         </p:txBody>
       </p:sp>
+      <p:graphicFrame>
+        <p:nvGraphicFramePr>
+          <p:cNvPr id="7" name="Object 6"/>
+          <p:cNvGraphicFramePr>
+            <a:graphicFrameLocks noChangeAspect="1"/>
+          </p:cNvGraphicFramePr>
+          <p:nvPr>
+            <p:extLst>
+              <p:ext uri="{D42A27DB-BD31-4B8C-83A1-F6EECF244321}">
+                <p14:modId xmlns:p14="http://schemas.microsoft.com/office/powerpoint/2010/main" val="616900628"/>
+              </p:ext>
+            </p:extLst>
+          </p:nvPr>
+        </p:nvGraphicFramePr>
+        <p:xfrm>
+          <a:off x="1216025" y="5046252"/>
+          <a:ext cx="6784975" cy="1278348"/>
+        </p:xfrm>
+        <a:graphic>
+          <a:graphicData uri="http://schemas.openxmlformats.org/presentationml/2006/ole">
+            <mc:AlternateContent xmlns:mc="http://schemas.openxmlformats.org/markup-compatibility/2006">
+              <mc:Choice xmlns:v="urn:schemas-microsoft-com:vml" Requires="v">
+                <p:oleObj spid="_x0000_s1025" name="Equation" r:id="rId5" imgW="5118100" imgH="965200" progId="Equation.3">
+                  <p:embed/>
+                </p:oleObj>
+              </mc:Choice>
+              <mc:Fallback>
+                <p:oleObj name="Equation" r:id="rId5" imgW="5118100" imgH="965200" progId="Equation.3">
+                  <p:embed/>
+                  <p:pic>
+                    <p:nvPicPr>
+                      <p:cNvPr id="0" name=""/>
+                      <p:cNvPicPr/>
+                      <p:nvPr/>
+                    </p:nvPicPr>
+                    <p:blipFill>
+                      <a:blip r:embed="rId6"/>
+                      <a:stretch>
+                        <a:fillRect/>
+                      </a:stretch>
+                    </p:blipFill>
+                    <p:spPr>
+                      <a:xfrm>
+                        <a:off x="1216025" y="5046252"/>
+                        <a:ext cx="6784975" cy="1278348"/>
+                      </a:xfrm>
+                      <a:prstGeom prst="rect">
+                        <a:avLst/>
+                      </a:prstGeom>
+                    </p:spPr>
+                  </p:pic>
+                </p:oleObj>
+              </mc:Fallback>
+            </mc:AlternateContent>
+          </a:graphicData>
+        </a:graphic>
+      </p:graphicFrame>
     </p:spTree>
     <p:extLst>
       <p:ext uri="{BB962C8B-B14F-4D97-AF65-F5344CB8AC3E}">
@@ -8467,7 +8627,7 @@
                                         <p:tgtEl>
                                           <p:spTgt spid="6">
                                             <p:txEl>
-                                              <p:pRg st="2" end="2"/>
+                                              <p:pRg st="1" end="1"/>
                                             </p:txEl>
                                           </p:spTgt>
                                         </p:tgtEl>
@@ -8485,7 +8645,7 @@
                                         <p:tgtEl>
                                           <p:spTgt spid="6">
                                             <p:txEl>
-                                              <p:pRg st="2" end="2"/>
+                                              <p:pRg st="1" end="1"/>
                                             </p:txEl>
                                           </p:spTgt>
                                         </p:tgtEl>
@@ -8528,7 +8688,7 @@
                                         <p:tgtEl>
                                           <p:spTgt spid="6">
                                             <p:txEl>
-                                              <p:pRg st="3" end="3"/>
+                                              <p:pRg st="2" end="2"/>
                                             </p:txEl>
                                           </p:spTgt>
                                         </p:tgtEl>
@@ -8546,7 +8706,7 @@
                                         <p:tgtEl>
                                           <p:spTgt spid="6">
                                             <p:txEl>
-                                              <p:pRg st="3" end="3"/>
+                                              <p:pRg st="2" end="2"/>
                                             </p:txEl>
                                           </p:spTgt>
                                         </p:tgtEl>
@@ -8589,7 +8749,7 @@
                                         <p:tgtEl>
                                           <p:spTgt spid="6">
                                             <p:txEl>
-                                              <p:pRg st="4" end="4"/>
+                                              <p:pRg st="3" end="3"/>
                                             </p:txEl>
                                           </p:spTgt>
                                         </p:tgtEl>
@@ -8607,7 +8767,7 @@
                                         <p:tgtEl>
                                           <p:spTgt spid="6">
                                             <p:txEl>
-                                              <p:pRg st="4" end="4"/>
+                                              <p:pRg st="3" end="3"/>
                                             </p:txEl>
                                           </p:spTgt>
                                         </p:tgtEl>
@@ -8650,7 +8810,7 @@
                                         <p:tgtEl>
                                           <p:spTgt spid="6">
                                             <p:txEl>
-                                              <p:pRg st="11" end="11"/>
+                                              <p:pRg st="10" end="10"/>
                                             </p:txEl>
                                           </p:spTgt>
                                         </p:tgtEl>
@@ -8668,7 +8828,7 @@
                                         <p:tgtEl>
                                           <p:spTgt spid="6">
                                             <p:txEl>
-                                              <p:pRg st="11" end="11"/>
+                                              <p:pRg st="10" end="10"/>
                                             </p:txEl>
                                           </p:spTgt>
                                         </p:tgtEl>
@@ -8711,7 +8871,7 @@
                                         <p:tgtEl>
                                           <p:spTgt spid="6">
                                             <p:txEl>
-                                              <p:pRg st="13" end="13"/>
+                                              <p:pRg st="12" end="12"/>
                                             </p:txEl>
                                           </p:spTgt>
                                         </p:tgtEl>
@@ -8729,7 +8889,7 @@
                                         <p:tgtEl>
                                           <p:spTgt spid="6">
                                             <p:txEl>
-                                              <p:pRg st="13" end="13"/>
+                                              <p:pRg st="12" end="12"/>
                                             </p:txEl>
                                           </p:spTgt>
                                         </p:tgtEl>
@@ -8805,6 +8965,67 @@
                       </p:childTnLst>
                     </p:cTn>
                   </p:par>
+                  <p:par>
+                    <p:cTn id="38" fill="hold">
+                      <p:stCondLst>
+                        <p:cond delay="indefinite"/>
+                      </p:stCondLst>
+                      <p:childTnLst>
+                        <p:par>
+                          <p:cTn id="39" fill="hold">
+                            <p:stCondLst>
+                              <p:cond delay="0"/>
+                            </p:stCondLst>
+                            <p:childTnLst>
+                              <p:par>
+                                <p:cTn id="40" presetID="3" presetClass="entr" presetSubtype="10" fill="hold" grpId="0" nodeType="clickEffect">
+                                  <p:stCondLst>
+                                    <p:cond delay="0"/>
+                                  </p:stCondLst>
+                                  <p:childTnLst>
+                                    <p:set>
+                                      <p:cBhvr>
+                                        <p:cTn id="41" dur="1" fill="hold">
+                                          <p:stCondLst>
+                                            <p:cond delay="0"/>
+                                          </p:stCondLst>
+                                        </p:cTn>
+                                        <p:tgtEl>
+                                          <p:spTgt spid="6">
+                                            <p:txEl>
+                                              <p:pRg st="18" end="18"/>
+                                            </p:txEl>
+                                          </p:spTgt>
+                                        </p:tgtEl>
+                                        <p:attrNameLst>
+                                          <p:attrName>style.visibility</p:attrName>
+                                        </p:attrNameLst>
+                                      </p:cBhvr>
+                                      <p:to>
+                                        <p:strVal val="visible"/>
+                                      </p:to>
+                                    </p:set>
+                                    <p:animEffect transition="in" filter="blinds(horizontal)">
+                                      <p:cBhvr>
+                                        <p:cTn id="42" dur="500"/>
+                                        <p:tgtEl>
+                                          <p:spTgt spid="6">
+                                            <p:txEl>
+                                              <p:pRg st="18" end="18"/>
+                                            </p:txEl>
+                                          </p:spTgt>
+                                        </p:tgtEl>
+                                      </p:cBhvr>
+                                    </p:animEffect>
+                                  </p:childTnLst>
+                                </p:cTn>
+                              </p:par>
+                            </p:childTnLst>
+                          </p:cTn>
+                        </p:par>
+                      </p:childTnLst>
+                    </p:cTn>
+                  </p:par>
                 </p:childTnLst>
               </p:cTn>
               <p:prevCondLst>
@@ -8940,13 +9161,6 @@
               </a:rPr>
               <a:t>Questions?</a:t>
             </a:r>
-            <a:endParaRPr lang="en-US" dirty="0" smtClean="0">
-              <a:solidFill>
-                <a:schemeClr val="accent1">
-                  <a:lumMod val="75000"/>
-                </a:schemeClr>
-              </a:solidFill>
-            </a:endParaRPr>
           </a:p>
         </p:txBody>
       </p:sp>
@@ -9212,7 +9426,19 @@
                   </a:schemeClr>
                 </a:solidFill>
               </a:rPr>
-              <a:t>We </a:t>
+              <a:t>We cannot arrive at the joint distribution from the marginal distributions </a:t>
+            </a:r>
+          </a:p>
+          <a:p>
+            <a:r>
+              <a:rPr lang="en-US" dirty="0">
+                <a:solidFill>
+                  <a:schemeClr val="accent1">
+                    <a:lumMod val="75000"/>
+                  </a:schemeClr>
+                </a:solidFill>
+              </a:rPr>
+              <a:t> </a:t>
             </a:r>
             <a:r>
               <a:rPr lang="en-US" dirty="0" smtClean="0">
@@ -9222,7 +9448,19 @@
                   </a:schemeClr>
                 </a:solidFill>
               </a:rPr>
-              <a:t>cannot </a:t>
+              <a:t>   (under independence this is trivial, but in other cases we need to know the    </a:t>
+            </a:r>
+          </a:p>
+          <a:p>
+            <a:r>
+              <a:rPr lang="en-US" dirty="0">
+                <a:solidFill>
+                  <a:schemeClr val="accent1">
+                    <a:lumMod val="75000"/>
+                  </a:schemeClr>
+                </a:solidFill>
+              </a:rPr>
+              <a:t> </a:t>
             </a:r>
             <a:r>
               <a:rPr lang="en-US" dirty="0" smtClean="0">
@@ -9232,101 +9470,7 @@
                   </a:schemeClr>
                 </a:solidFill>
               </a:rPr>
-              <a:t>arrive at the joint distribution from the </a:t>
-            </a:r>
-            <a:r>
-              <a:rPr lang="en-US" dirty="0" smtClean="0">
-                <a:solidFill>
-                  <a:schemeClr val="accent1">
-                    <a:lumMod val="75000"/>
-                  </a:schemeClr>
-                </a:solidFill>
-              </a:rPr>
-              <a:t>marginal distributions </a:t>
-            </a:r>
-          </a:p>
-          <a:p>
-            <a:r>
-              <a:rPr lang="en-US" dirty="0">
-                <a:solidFill>
-                  <a:schemeClr val="accent1">
-                    <a:lumMod val="75000"/>
-                  </a:schemeClr>
-                </a:solidFill>
-              </a:rPr>
-              <a:t> </a:t>
-            </a:r>
-            <a:r>
-              <a:rPr lang="en-US" dirty="0" smtClean="0">
-                <a:solidFill>
-                  <a:schemeClr val="accent1">
-                    <a:lumMod val="75000"/>
-                  </a:schemeClr>
-                </a:solidFill>
-              </a:rPr>
-              <a:t>   </a:t>
-            </a:r>
-            <a:r>
-              <a:rPr lang="en-US" dirty="0" smtClean="0">
-                <a:solidFill>
-                  <a:schemeClr val="accent1">
-                    <a:lumMod val="75000"/>
-                  </a:schemeClr>
-                </a:solidFill>
-              </a:rPr>
-              <a:t>(</a:t>
-            </a:r>
-            <a:r>
-              <a:rPr lang="en-US" dirty="0" smtClean="0">
-                <a:solidFill>
-                  <a:schemeClr val="accent1">
-                    <a:lumMod val="75000"/>
-                  </a:schemeClr>
-                </a:solidFill>
-              </a:rPr>
-              <a:t>under independence this is </a:t>
-            </a:r>
-            <a:r>
-              <a:rPr lang="en-US" dirty="0" smtClean="0">
-                <a:solidFill>
-                  <a:schemeClr val="accent1">
-                    <a:lumMod val="75000"/>
-                  </a:schemeClr>
-                </a:solidFill>
-              </a:rPr>
-              <a:t>trivial, but in other cases we need to know the    </a:t>
-            </a:r>
-          </a:p>
-          <a:p>
-            <a:r>
-              <a:rPr lang="en-US" dirty="0">
-                <a:solidFill>
-                  <a:schemeClr val="accent1">
-                    <a:lumMod val="75000"/>
-                  </a:schemeClr>
-                </a:solidFill>
-              </a:rPr>
-              <a:t> </a:t>
-            </a:r>
-            <a:r>
-              <a:rPr lang="en-US" dirty="0" smtClean="0">
-                <a:solidFill>
-                  <a:schemeClr val="accent1">
-                    <a:lumMod val="75000"/>
-                  </a:schemeClr>
-                </a:solidFill>
-              </a:rPr>
-              <a:t>    </a:t>
-            </a:r>
-            <a:r>
-              <a:rPr lang="en-US" dirty="0" smtClean="0">
-                <a:solidFill>
-                  <a:schemeClr val="accent1">
-                    <a:lumMod val="75000"/>
-                  </a:schemeClr>
-                </a:solidFill>
-              </a:rPr>
-              <a:t>conditional distributions and one of the marginal to get to the joint distribution).</a:t>
+              <a:t>    conditional distributions and one of the marginal to get to the joint distribution).</a:t>
             </a:r>
           </a:p>
           <a:p>
@@ -9624,27 +9768,7 @@
                   </a:schemeClr>
                 </a:solidFill>
               </a:rPr>
-              <a:t>Define </a:t>
-            </a:r>
-            <a:r>
-              <a:rPr lang="en-US" dirty="0" smtClean="0">
-                <a:solidFill>
-                  <a:schemeClr val="accent1">
-                    <a:lumMod val="75000"/>
-                  </a:schemeClr>
-                </a:solidFill>
-              </a:rPr>
-              <a:t>Exchangeable </a:t>
-            </a:r>
-            <a:r>
-              <a:rPr lang="en-US" dirty="0" smtClean="0">
-                <a:solidFill>
-                  <a:schemeClr val="accent1">
-                    <a:lumMod val="75000"/>
-                  </a:schemeClr>
-                </a:solidFill>
-              </a:rPr>
-              <a:t>Sequence of Random Variables</a:t>
+              <a:t>Define Exchangeable Sequence of Random Variables</a:t>
             </a:r>
           </a:p>
           <a:p>
@@ -9681,7 +9805,19 @@
             </a:r>
             <a:r>
               <a:rPr lang="en-US" dirty="0" smtClean="0"/>
-              <a:t>, </a:t>
+              <a:t>, Y</a:t>
+            </a:r>
+            <a:r>
+              <a:rPr lang="en-US" baseline="-25000" dirty="0" smtClean="0"/>
+              <a:t>2</a:t>
+            </a:r>
+            <a:r>
+              <a:rPr lang="en-US" dirty="0" smtClean="0"/>
+              <a:t>,…</a:t>
+            </a:r>
+            <a:r>
+              <a:rPr lang="en-US" dirty="0"/>
+              <a:t>. </a:t>
             </a:r>
             <a:r>
               <a:rPr lang="en-US" dirty="0" smtClean="0"/>
@@ -9689,137 +9825,112 @@
             </a:r>
             <a:r>
               <a:rPr lang="en-US" baseline="-25000" dirty="0" smtClean="0"/>
+              <a:t>N</a:t>
+            </a:r>
+          </a:p>
+          <a:p>
+            <a:r>
+              <a:rPr lang="en-US" dirty="0">
+                <a:solidFill>
+                  <a:schemeClr val="accent1">
+                    <a:lumMod val="75000"/>
+                  </a:schemeClr>
+                </a:solidFill>
+              </a:rPr>
+              <a:t>	</a:t>
+            </a:r>
+            <a:r>
+              <a:rPr lang="en-US" dirty="0" smtClean="0">
+                <a:solidFill>
+                  <a:schemeClr val="accent1">
+                    <a:lumMod val="75000"/>
+                  </a:schemeClr>
+                </a:solidFill>
+              </a:rPr>
+              <a:t>- Permutation</a:t>
+            </a:r>
+            <a:r>
+              <a:rPr lang="en-US" dirty="0">
+                <a:solidFill>
+                  <a:schemeClr val="accent1">
+                    <a:lumMod val="75000"/>
+                  </a:schemeClr>
+                </a:solidFill>
+              </a:rPr>
+              <a:t>: </a:t>
+            </a:r>
+            <a:r>
+              <a:rPr lang="en-US" dirty="0" smtClean="0">
+                <a:solidFill>
+                  <a:srgbClr val="000000"/>
+                </a:solidFill>
+              </a:rPr>
+              <a:t>π={π</a:t>
+            </a:r>
+            <a:r>
+              <a:rPr lang="en-US" baseline="-25000" dirty="0" smtClean="0">
+                <a:solidFill>
+                  <a:srgbClr val="000000"/>
+                </a:solidFill>
+              </a:rPr>
+              <a:t>1</a:t>
+            </a:r>
+            <a:r>
+              <a:rPr lang="en-US" dirty="0" smtClean="0">
+                <a:solidFill>
+                  <a:srgbClr val="000000"/>
+                </a:solidFill>
+              </a:rPr>
+              <a:t>, π</a:t>
+            </a:r>
+            <a:r>
+              <a:rPr lang="en-US" baseline="-25000" dirty="0" smtClean="0">
+                <a:solidFill>
+                  <a:srgbClr val="000000"/>
+                </a:solidFill>
+              </a:rPr>
               <a:t>2</a:t>
             </a:r>
             <a:r>
-              <a:rPr lang="en-US" dirty="0" smtClean="0"/>
+              <a:rPr lang="en-US" dirty="0" smtClean="0">
+                <a:solidFill>
+                  <a:srgbClr val="000000"/>
+                </a:solidFill>
+              </a:rPr>
               <a:t>,</a:t>
             </a:r>
             <a:r>
-              <a:rPr lang="en-US" dirty="0" smtClean="0"/>
-              <a:t>…</a:t>
-            </a:r>
-            <a:r>
-              <a:rPr lang="en-US" dirty="0"/>
-              <a:t>. </a:t>
-            </a:r>
-            <a:r>
-              <a:rPr lang="en-US" dirty="0" smtClean="0"/>
-              <a:t>Y</a:t>
-            </a:r>
-            <a:r>
-              <a:rPr lang="en-US" baseline="-25000" dirty="0" smtClean="0"/>
+              <a:rPr lang="en-US" dirty="0">
+                <a:solidFill>
+                  <a:srgbClr val="000000"/>
+                </a:solidFill>
+              </a:rPr>
+              <a:t>…, , </a:t>
+            </a:r>
+            <a:r>
+              <a:rPr lang="en-US" dirty="0" smtClean="0">
+                <a:solidFill>
+                  <a:srgbClr val="000000"/>
+                </a:solidFill>
+              </a:rPr>
+              <a:t>π</a:t>
+            </a:r>
+            <a:r>
+              <a:rPr lang="en-US" baseline="-25000" dirty="0">
+                <a:solidFill>
+                  <a:srgbClr val="000000"/>
+                </a:solidFill>
+              </a:rPr>
               <a:t>N</a:t>
             </a:r>
-          </a:p>
-          <a:p>
-            <a:r>
-              <a:rPr lang="en-US" dirty="0">
-                <a:solidFill>
-                  <a:schemeClr val="accent1">
-                    <a:lumMod val="75000"/>
-                  </a:schemeClr>
-                </a:solidFill>
-              </a:rPr>
-              <a:t>	</a:t>
-            </a:r>
             <a:r>
               <a:rPr lang="en-US" dirty="0" smtClean="0">
                 <a:solidFill>
-                  <a:schemeClr val="accent1">
-                    <a:lumMod val="75000"/>
-                  </a:schemeClr>
-                </a:solidFill>
-              </a:rPr>
-              <a:t>- Permutation</a:t>
-            </a:r>
-            <a:r>
-              <a:rPr lang="en-US" dirty="0">
-                <a:solidFill>
-                  <a:schemeClr val="accent1">
-                    <a:lumMod val="75000"/>
-                  </a:schemeClr>
-                </a:solidFill>
-              </a:rPr>
-              <a:t>: </a:t>
-            </a:r>
-            <a:r>
-              <a:rPr lang="en-US" dirty="0" smtClean="0">
-                <a:solidFill>
                   <a:srgbClr val="000000"/>
                 </a:solidFill>
               </a:rPr>
-              <a:t>π={π</a:t>
-            </a:r>
-            <a:r>
-              <a:rPr lang="en-US" baseline="-25000" dirty="0" smtClean="0">
-                <a:solidFill>
-                  <a:srgbClr val="000000"/>
-                </a:solidFill>
-              </a:rPr>
-              <a:t>1</a:t>
-            </a:r>
-            <a:r>
-              <a:rPr lang="en-US" dirty="0" smtClean="0">
-                <a:solidFill>
-                  <a:srgbClr val="000000"/>
-                </a:solidFill>
-              </a:rPr>
-              <a:t>, π</a:t>
-            </a:r>
-            <a:r>
-              <a:rPr lang="en-US" baseline="-25000" dirty="0" smtClean="0">
-                <a:solidFill>
-                  <a:srgbClr val="000000"/>
-                </a:solidFill>
-              </a:rPr>
-              <a:t>2</a:t>
-            </a:r>
-            <a:r>
-              <a:rPr lang="en-US" dirty="0" smtClean="0">
-                <a:solidFill>
-                  <a:srgbClr val="000000"/>
-                </a:solidFill>
-              </a:rPr>
-              <a:t>,</a:t>
-            </a:r>
-            <a:r>
-              <a:rPr lang="en-US" dirty="0">
-                <a:solidFill>
-                  <a:srgbClr val="000000"/>
-                </a:solidFill>
-              </a:rPr>
-              <a:t>…, , </a:t>
-            </a:r>
-            <a:r>
-              <a:rPr lang="en-US" dirty="0" smtClean="0">
-                <a:solidFill>
-                  <a:srgbClr val="000000"/>
-                </a:solidFill>
-              </a:rPr>
-              <a:t>π</a:t>
-            </a:r>
-            <a:r>
-              <a:rPr lang="en-US" baseline="-25000" dirty="0">
-                <a:solidFill>
-                  <a:srgbClr val="000000"/>
-                </a:solidFill>
-              </a:rPr>
-              <a:t>N</a:t>
-            </a:r>
-            <a:r>
-              <a:rPr lang="en-US" dirty="0" smtClean="0">
-                <a:solidFill>
-                  <a:srgbClr val="000000"/>
-                </a:solidFill>
-              </a:rPr>
               <a:t>}</a:t>
             </a:r>
-            <a:endParaRPr lang="en-US" dirty="0" smtClean="0">
-              <a:solidFill>
-                <a:srgbClr val="000000"/>
-              </a:solidFill>
-            </a:endParaRPr>
           </a:p>
           <a:p>
             <a:endParaRPr lang="en-US" dirty="0">
@@ -9868,7 +9979,23 @@
                   <a:srgbClr val="000000"/>
                 </a:solidFill>
               </a:rPr>
-              <a:t>p</a:t>
+              <a:t>p(Y</a:t>
+            </a:r>
+            <a:r>
+              <a:rPr lang="en-US" baseline="-25000" dirty="0" smtClean="0">
+                <a:solidFill>
+                  <a:srgbClr val="000000"/>
+                </a:solidFill>
+              </a:rPr>
+              <a:t>π</a:t>
+            </a:r>
+            <a:r>
+              <a:rPr lang="en-US" sz="1400" baseline="-25000" dirty="0" smtClean="0">
+                <a:solidFill>
+                  <a:srgbClr val="000000"/>
+                </a:solidFill>
+              </a:rPr>
+              <a:t>1</a:t>
             </a:r>
             <a:r>
               <a:rPr lang="en-US" dirty="0" smtClean="0">
@@ -9876,7 +10003,7 @@
                   <a:srgbClr val="000000"/>
                 </a:solidFill>
               </a:rPr>
-              <a:t>(Y</a:t>
+              <a:t>, Y</a:t>
             </a:r>
             <a:r>
               <a:rPr lang="en-US" baseline="-25000" dirty="0" smtClean="0">
@@ -9892,7 +10019,7 @@
                   <a:srgbClr val="000000"/>
                 </a:solidFill>
               </a:rPr>
-              <a:t>1</a:t>
+              <a:t>2</a:t>
             </a:r>
             <a:r>
               <a:rPr lang="en-US" dirty="0" smtClean="0">
@@ -9900,55 +10027,15 @@
                   <a:srgbClr val="000000"/>
                 </a:solidFill>
               </a:rPr>
-              <a:t>, </a:t>
-            </a:r>
-            <a:r>
-              <a:rPr lang="en-US" dirty="0" smtClean="0">
+              <a:t> </a:t>
+            </a:r>
+            <a:r>
+              <a:rPr lang="en-US" dirty="0">
                 <a:solidFill>
                   <a:srgbClr val="000000"/>
                 </a:solidFill>
               </a:rPr>
-              <a:t>Y</a:t>
-            </a:r>
-            <a:r>
-              <a:rPr lang="en-US" baseline="-25000" dirty="0" smtClean="0">
-                <a:solidFill>
-                  <a:srgbClr val="000000"/>
-                </a:solidFill>
-              </a:rPr>
-              <a:t>π</a:t>
-            </a:r>
-            <a:r>
-              <a:rPr lang="en-US" sz="1400" baseline="-25000" dirty="0" smtClean="0">
-                <a:solidFill>
-                  <a:srgbClr val="000000"/>
-                </a:solidFill>
-              </a:rPr>
-              <a:t>2</a:t>
-            </a:r>
-            <a:r>
-              <a:rPr lang="en-US" dirty="0" smtClean="0">
-                <a:solidFill>
-                  <a:srgbClr val="000000"/>
-                </a:solidFill>
-              </a:rPr>
-              <a:t> </a:t>
-            </a:r>
-            <a:r>
-              <a:rPr lang="en-US" dirty="0">
-                <a:solidFill>
-                  <a:srgbClr val="000000"/>
-                </a:solidFill>
-              </a:rPr>
-              <a:t>,…</a:t>
-            </a:r>
-            <a:r>
-              <a:rPr lang="en-US" dirty="0">
-                <a:solidFill>
-                  <a:srgbClr val="000000"/>
-                </a:solidFill>
-              </a:rPr>
-              <a:t>., </a:t>
+              <a:t>,…., </a:t>
             </a:r>
             <a:r>
               <a:rPr lang="en-US" dirty="0" smtClean="0">
@@ -10015,17 +10102,7 @@
                   </a:schemeClr>
                 </a:solidFill>
               </a:rPr>
-              <a:t>Note: sequence of IID RVs are exchangeable (discuss), but the converse is not </a:t>
-            </a:r>
-            <a:r>
-              <a:rPr lang="en-US" dirty="0" smtClean="0">
-                <a:solidFill>
-                  <a:schemeClr val="accent1">
-                    <a:lumMod val="75000"/>
-                  </a:schemeClr>
-                </a:solidFill>
-              </a:rPr>
-              <a:t>TRUE</a:t>
+              <a:t>Note: sequence of IID RVs are exchangeable (discuss), but the converse is not TRUE</a:t>
             </a:r>
           </a:p>
           <a:p>

</xml_diff>